<commit_message>
Major baseline; working copy; testing-in-progress; expiry cancels remain an issue; request, order processing stable; stops/positions are in-progress ~50% complete; new db ddl reflects revision in orphan handling; testing nearing completion; next Up: algo/fractal/fibo integration;
</commit_message>
<xml_diff>
--- a/~Documents/Recommends/ddict-issues.pptx
+++ b/~Documents/Recommends/ddict-issues.pptx
@@ -5,13 +5,14 @@
     <p:sldMasterId id="2147483648" r:id="rId1"/>
   </p:sldMasterIdLst>
   <p:notesMasterIdLst>
-    <p:notesMasterId r:id="rId4"/>
+    <p:notesMasterId r:id="rId5"/>
   </p:notesMasterIdLst>
   <p:handoutMasterIdLst>
-    <p:handoutMasterId r:id="rId5"/>
+    <p:handoutMasterId r:id="rId6"/>
   </p:handoutMasterIdLst>
   <p:sldIdLst>
     <p:sldId id="256" r:id="rId3"/>
+    <p:sldId id="257" r:id="rId4"/>
   </p:sldIdLst>
   <p:sldSz cx="12192000" cy="6858000"/>
   <p:notesSz cx="7103745" cy="10234295"/>
@@ -3888,6 +3889,322 @@
           </a:p>
         </p:txBody>
       </p:sp>
+    </p:spTree>
+  </p:cSld>
+  <p:clrMapOvr>
+    <a:masterClrMapping/>
+  </p:clrMapOvr>
+</p:sld>
+</file>
+
+<file path=ppt/slides/slide2.xml><?xml version="1.0" encoding="utf-8"?>
+<p:sld xmlns:a="http://schemas.openxmlformats.org/drawingml/2006/main" xmlns:r="http://schemas.openxmlformats.org/officeDocument/2006/relationships" xmlns:p="http://schemas.openxmlformats.org/presentationml/2006/main">
+  <p:cSld>
+    <p:spTree>
+      <p:nvGrpSpPr>
+        <p:cNvPr id="1" name=""/>
+        <p:cNvGrpSpPr/>
+        <p:nvPr/>
+      </p:nvGrpSpPr>
+      <p:grpSpPr/>
+      <p:pic>
+        <p:nvPicPr>
+          <p:cNvPr id="4" name="Picture 3"/>
+          <p:cNvPicPr>
+            <a:picLocks noChangeAspect="1"/>
+          </p:cNvPicPr>
+          <p:nvPr/>
+        </p:nvPicPr>
+        <p:blipFill>
+          <a:blip r:embed="rId1"/>
+          <a:stretch>
+            <a:fillRect/>
+          </a:stretch>
+        </p:blipFill>
+        <p:spPr>
+          <a:xfrm>
+            <a:off x="746760" y="215900"/>
+            <a:ext cx="10699115" cy="6426200"/>
+          </a:xfrm>
+          <a:prstGeom prst="rect">
+            <a:avLst/>
+          </a:prstGeom>
+        </p:spPr>
+      </p:pic>
+      <p:sp>
+        <p:nvSpPr>
+          <p:cNvPr id="6" name="Rectangles 5"/>
+          <p:cNvSpPr/>
+          <p:nvPr/>
+        </p:nvSpPr>
+        <p:spPr>
+          <a:xfrm>
+            <a:off x="8846185" y="3356610"/>
+            <a:ext cx="1746885" cy="285115"/>
+          </a:xfrm>
+          <a:prstGeom prst="rect">
+            <a:avLst/>
+          </a:prstGeom>
+          <a:noFill/>
+          <a:ln w="19050">
+            <a:solidFill>
+              <a:srgbClr val="FF0000"/>
+            </a:solidFill>
+          </a:ln>
+          <a:extLst>
+            <a:ext uri="{909E8E84-426E-40DD-AFC4-6F175D3DCCD1}">
+              <a14:hiddenFill xmlns:a14="http://schemas.microsoft.com/office/drawing/2010/main">
+                <a:solidFill>
+                  <a:schemeClr val="accent1"/>
+                </a:solidFill>
+              </a14:hiddenFill>
+            </a:ext>
+          </a:extLst>
+        </p:spPr>
+        <p:style>
+          <a:lnRef idx="2">
+            <a:schemeClr val="accent1">
+              <a:shade val="50000"/>
+            </a:schemeClr>
+          </a:lnRef>
+          <a:fillRef idx="1">
+            <a:schemeClr val="accent1"/>
+          </a:fillRef>
+          <a:effectRef idx="0">
+            <a:schemeClr val="accent1"/>
+          </a:effectRef>
+          <a:fontRef idx="minor">
+            <a:schemeClr val="lt1"/>
+          </a:fontRef>
+        </p:style>
+        <p:txBody>
+          <a:bodyPr rtlCol="0" anchor="ctr"/>
+          <a:p>
+            <a:pPr algn="ctr"/>
+            <a:endParaRPr lang="en-US"/>
+          </a:p>
+        </p:txBody>
+      </p:sp>
+      <p:sp>
+        <p:nvSpPr>
+          <p:cNvPr id="8" name="Oval 7"/>
+          <p:cNvSpPr/>
+          <p:nvPr/>
+        </p:nvSpPr>
+        <p:spPr>
+          <a:xfrm>
+            <a:off x="7239635" y="5064760"/>
+            <a:ext cx="506095" cy="498475"/>
+          </a:xfrm>
+          <a:prstGeom prst="ellipse">
+            <a:avLst/>
+          </a:prstGeom>
+          <a:solidFill>
+            <a:srgbClr val="FF0000"/>
+          </a:solidFill>
+        </p:spPr>
+        <p:style>
+          <a:lnRef idx="2">
+            <a:schemeClr val="dk1">
+              <a:shade val="50000"/>
+            </a:schemeClr>
+          </a:lnRef>
+          <a:fillRef idx="1">
+            <a:schemeClr val="dk1"/>
+          </a:fillRef>
+          <a:effectRef idx="0">
+            <a:schemeClr val="dk1"/>
+          </a:effectRef>
+          <a:fontRef idx="minor">
+            <a:schemeClr val="lt1"/>
+          </a:fontRef>
+        </p:style>
+        <p:txBody>
+          <a:bodyPr rtlCol="0" anchor="ctr"/>
+          <a:p>
+            <a:pPr algn="ctr"/>
+            <a:r>
+              <a:rPr lang="en-US"/>
+              <a:t>?</a:t>
+            </a:r>
+            <a:endParaRPr lang="en-US"/>
+          </a:p>
+        </p:txBody>
+      </p:sp>
+      <p:cxnSp>
+        <p:nvCxnSpPr>
+          <p:cNvPr id="9" name="Straight Arrow Connector 8"/>
+          <p:cNvCxnSpPr>
+            <a:stCxn id="6" idx="1"/>
+            <a:endCxn id="8" idx="7"/>
+          </p:cNvCxnSpPr>
+          <p:nvPr/>
+        </p:nvCxnSpPr>
+        <p:spPr>
+          <a:xfrm flipH="1">
+            <a:off x="7671435" y="3499485"/>
+            <a:ext cx="1174750" cy="1638300"/>
+          </a:xfrm>
+          <a:prstGeom prst="straightConnector1">
+            <a:avLst/>
+          </a:prstGeom>
+          <a:ln>
+            <a:solidFill>
+              <a:srgbClr val="FF0000"/>
+            </a:solidFill>
+            <a:tailEnd type="arrow"/>
+          </a:ln>
+        </p:spPr>
+        <p:style>
+          <a:lnRef idx="1">
+            <a:schemeClr val="accent1"/>
+          </a:lnRef>
+          <a:fillRef idx="0">
+            <a:schemeClr val="accent1"/>
+          </a:fillRef>
+          <a:effectRef idx="0">
+            <a:schemeClr val="accent1"/>
+          </a:effectRef>
+          <a:fontRef idx="minor">
+            <a:schemeClr val="tx1"/>
+          </a:fontRef>
+        </p:style>
+      </p:cxnSp>
+      <p:sp>
+        <p:nvSpPr>
+          <p:cNvPr id="7" name="Rectangles 6"/>
+          <p:cNvSpPr/>
+          <p:nvPr/>
+        </p:nvSpPr>
+        <p:spPr>
+          <a:xfrm>
+            <a:off x="8846185" y="3061970"/>
+            <a:ext cx="1746885" cy="285115"/>
+          </a:xfrm>
+          <a:prstGeom prst="rect">
+            <a:avLst/>
+          </a:prstGeom>
+          <a:noFill/>
+          <a:ln w="28575">
+            <a:solidFill>
+              <a:srgbClr val="00B050"/>
+            </a:solidFill>
+          </a:ln>
+          <a:extLst>
+            <a:ext uri="{909E8E84-426E-40DD-AFC4-6F175D3DCCD1}">
+              <a14:hiddenFill xmlns:a14="http://schemas.microsoft.com/office/drawing/2010/main">
+                <a:solidFill>
+                  <a:srgbClr val="FFFF00"/>
+                </a:solidFill>
+              </a14:hiddenFill>
+            </a:ext>
+          </a:extLst>
+        </p:spPr>
+        <p:style>
+          <a:lnRef idx="2">
+            <a:schemeClr val="accent6">
+              <a:shade val="50000"/>
+            </a:schemeClr>
+          </a:lnRef>
+          <a:fillRef idx="1">
+            <a:schemeClr val="accent6"/>
+          </a:fillRef>
+          <a:effectRef idx="0">
+            <a:schemeClr val="accent6"/>
+          </a:effectRef>
+          <a:fontRef idx="minor">
+            <a:schemeClr val="lt1"/>
+          </a:fontRef>
+        </p:style>
+        <p:txBody>
+          <a:bodyPr rtlCol="0" anchor="ctr"/>
+          <a:p>
+            <a:pPr algn="ctr"/>
+            <a:endParaRPr lang="en-US"/>
+          </a:p>
+        </p:txBody>
+      </p:sp>
+      <p:sp>
+        <p:nvSpPr>
+          <p:cNvPr id="13" name="Oval 12"/>
+          <p:cNvSpPr/>
+          <p:nvPr/>
+        </p:nvSpPr>
+        <p:spPr>
+          <a:xfrm>
+            <a:off x="3979545" y="4900295"/>
+            <a:ext cx="506095" cy="498475"/>
+          </a:xfrm>
+          <a:prstGeom prst="ellipse">
+            <a:avLst/>
+          </a:prstGeom>
+        </p:spPr>
+        <p:style>
+          <a:lnRef idx="2">
+            <a:schemeClr val="accent6">
+              <a:shade val="50000"/>
+            </a:schemeClr>
+          </a:lnRef>
+          <a:fillRef idx="1">
+            <a:schemeClr val="accent6"/>
+          </a:fillRef>
+          <a:effectRef idx="0">
+            <a:schemeClr val="accent6"/>
+          </a:effectRef>
+          <a:fontRef idx="minor">
+            <a:schemeClr val="lt1"/>
+          </a:fontRef>
+        </p:style>
+        <p:txBody>
+          <a:bodyPr rtlCol="0" anchor="ctr"/>
+          <a:p>
+            <a:pPr algn="ctr"/>
+            <a:r>
+              <a:rPr lang="en-US"/>
+              <a:t>#</a:t>
+            </a:r>
+            <a:endParaRPr lang="en-US"/>
+          </a:p>
+        </p:txBody>
+      </p:sp>
+      <p:cxnSp>
+        <p:nvCxnSpPr>
+          <p:cNvPr id="15" name="Straight Arrow Connector 14"/>
+          <p:cNvCxnSpPr>
+            <a:stCxn id="7" idx="1"/>
+            <a:endCxn id="13" idx="7"/>
+          </p:cNvCxnSpPr>
+          <p:nvPr/>
+        </p:nvCxnSpPr>
+        <p:spPr>
+          <a:xfrm flipH="1">
+            <a:off x="4411345" y="3204845"/>
+            <a:ext cx="4434840" cy="1768475"/>
+          </a:xfrm>
+          <a:prstGeom prst="straightConnector1">
+            <a:avLst/>
+          </a:prstGeom>
+          <a:ln>
+            <a:tailEnd type="arrow" w="med" len="med"/>
+          </a:ln>
+        </p:spPr>
+        <p:style>
+          <a:lnRef idx="2">
+            <a:schemeClr val="accent6">
+              <a:shade val="50000"/>
+            </a:schemeClr>
+          </a:lnRef>
+          <a:fillRef idx="1">
+            <a:schemeClr val="accent6"/>
+          </a:fillRef>
+          <a:effectRef idx="0">
+            <a:schemeClr val="accent6"/>
+          </a:effectRef>
+          <a:fontRef idx="minor">
+            <a:schemeClr val="lt1"/>
+          </a:fontRef>
+        </p:style>
+      </p:cxnSp>
     </p:spTree>
   </p:cSld>
   <p:clrMapOvr>

</xml_diff>